<commit_message>
upd manual with pixel types
</commit_message>
<xml_diff>
--- a/manual/Pictures 2.0.pptx
+++ b/manual/Pictures 2.0.pptx
@@ -296,7 +296,7 @@
           <a:p>
             <a:fld id="{55465C39-D47E-4138-800A-7D6CA5F3257E}" type="datetimeFigureOut">
               <a:rPr lang="ru-RU" smtClean="0"/>
-              <a:t>10.12.2022</a:t>
+              <a:t>08.04.2023</a:t>
             </a:fld>
             <a:endParaRPr lang="ru-RU"/>
           </a:p>
@@ -466,7 +466,7 @@
           <a:p>
             <a:fld id="{55465C39-D47E-4138-800A-7D6CA5F3257E}" type="datetimeFigureOut">
               <a:rPr lang="ru-RU" smtClean="0"/>
-              <a:t>10.12.2022</a:t>
+              <a:t>08.04.2023</a:t>
             </a:fld>
             <a:endParaRPr lang="ru-RU"/>
           </a:p>
@@ -646,7 +646,7 @@
           <a:p>
             <a:fld id="{55465C39-D47E-4138-800A-7D6CA5F3257E}" type="datetimeFigureOut">
               <a:rPr lang="ru-RU" smtClean="0"/>
-              <a:t>10.12.2022</a:t>
+              <a:t>08.04.2023</a:t>
             </a:fld>
             <a:endParaRPr lang="ru-RU"/>
           </a:p>
@@ -816,7 +816,7 @@
           <a:p>
             <a:fld id="{55465C39-D47E-4138-800A-7D6CA5F3257E}" type="datetimeFigureOut">
               <a:rPr lang="ru-RU" smtClean="0"/>
-              <a:t>10.12.2022</a:t>
+              <a:t>08.04.2023</a:t>
             </a:fld>
             <a:endParaRPr lang="ru-RU"/>
           </a:p>
@@ -1060,7 +1060,7 @@
           <a:p>
             <a:fld id="{55465C39-D47E-4138-800A-7D6CA5F3257E}" type="datetimeFigureOut">
               <a:rPr lang="ru-RU" smtClean="0"/>
-              <a:t>10.12.2022</a:t>
+              <a:t>08.04.2023</a:t>
             </a:fld>
             <a:endParaRPr lang="ru-RU"/>
           </a:p>
@@ -1292,7 +1292,7 @@
           <a:p>
             <a:fld id="{55465C39-D47E-4138-800A-7D6CA5F3257E}" type="datetimeFigureOut">
               <a:rPr lang="ru-RU" smtClean="0"/>
-              <a:t>10.12.2022</a:t>
+              <a:t>08.04.2023</a:t>
             </a:fld>
             <a:endParaRPr lang="ru-RU"/>
           </a:p>
@@ -1659,7 +1659,7 @@
           <a:p>
             <a:fld id="{55465C39-D47E-4138-800A-7D6CA5F3257E}" type="datetimeFigureOut">
               <a:rPr lang="ru-RU" smtClean="0"/>
-              <a:t>10.12.2022</a:t>
+              <a:t>08.04.2023</a:t>
             </a:fld>
             <a:endParaRPr lang="ru-RU"/>
           </a:p>
@@ -1777,7 +1777,7 @@
           <a:p>
             <a:fld id="{55465C39-D47E-4138-800A-7D6CA5F3257E}" type="datetimeFigureOut">
               <a:rPr lang="ru-RU" smtClean="0"/>
-              <a:t>10.12.2022</a:t>
+              <a:t>08.04.2023</a:t>
             </a:fld>
             <a:endParaRPr lang="ru-RU"/>
           </a:p>
@@ -1872,7 +1872,7 @@
           <a:p>
             <a:fld id="{55465C39-D47E-4138-800A-7D6CA5F3257E}" type="datetimeFigureOut">
               <a:rPr lang="ru-RU" smtClean="0"/>
-              <a:t>10.12.2022</a:t>
+              <a:t>08.04.2023</a:t>
             </a:fld>
             <a:endParaRPr lang="ru-RU"/>
           </a:p>
@@ -2149,7 +2149,7 @@
           <a:p>
             <a:fld id="{55465C39-D47E-4138-800A-7D6CA5F3257E}" type="datetimeFigureOut">
               <a:rPr lang="ru-RU" smtClean="0"/>
-              <a:t>10.12.2022</a:t>
+              <a:t>08.04.2023</a:t>
             </a:fld>
             <a:endParaRPr lang="ru-RU"/>
           </a:p>
@@ -2406,7 +2406,7 @@
           <a:p>
             <a:fld id="{55465C39-D47E-4138-800A-7D6CA5F3257E}" type="datetimeFigureOut">
               <a:rPr lang="ru-RU" smtClean="0"/>
-              <a:t>10.12.2022</a:t>
+              <a:t>08.04.2023</a:t>
             </a:fld>
             <a:endParaRPr lang="ru-RU"/>
           </a:p>
@@ -2619,7 +2619,7 @@
           <a:p>
             <a:fld id="{55465C39-D47E-4138-800A-7D6CA5F3257E}" type="datetimeFigureOut">
               <a:rPr lang="ru-RU" smtClean="0"/>
-              <a:t>10.12.2022</a:t>
+              <a:t>08.04.2023</a:t>
             </a:fld>
             <a:endParaRPr lang="ru-RU"/>
           </a:p>
@@ -12817,10 +12817,10 @@
       </p:grpSp>
       <p:grpSp>
         <p:nvGrpSpPr>
-          <p:cNvPr id="14" name="Group 13">
+          <p:cNvPr id="20" name="Group 19">
             <a:extLst>
               <a:ext uri="{FF2B5EF4-FFF2-40B4-BE49-F238E27FC236}">
-                <a16:creationId xmlns:a16="http://schemas.microsoft.com/office/drawing/2014/main" id="{F4893D02-0E9B-2031-4134-5F7A75E26582}"/>
+                <a16:creationId xmlns:a16="http://schemas.microsoft.com/office/drawing/2014/main" id="{B54FC337-B327-7C36-2163-7490E7754D20}"/>
               </a:ext>
             </a:extLst>
           </p:cNvPr>
@@ -12829,18 +12829,18 @@
         </p:nvGrpSpPr>
         <p:grpSpPr>
           <a:xfrm>
-            <a:off x="1265520" y="3756660"/>
-            <a:ext cx="6445319" cy="609600"/>
-            <a:chOff x="1265520" y="3756660"/>
-            <a:chExt cx="6445319" cy="609600"/>
+            <a:off x="1262062" y="3762342"/>
+            <a:ext cx="6443663" cy="600108"/>
+            <a:chOff x="1262062" y="3762342"/>
+            <a:chExt cx="6443663" cy="600108"/>
           </a:xfrm>
         </p:grpSpPr>
         <p:pic>
           <p:nvPicPr>
-            <p:cNvPr id="10" name="Picture 9">
+            <p:cNvPr id="19" name="Picture 18">
               <a:extLst>
                 <a:ext uri="{FF2B5EF4-FFF2-40B4-BE49-F238E27FC236}">
-                  <a16:creationId xmlns:a16="http://schemas.microsoft.com/office/drawing/2014/main" id="{6A3D80CA-3C70-28AD-F41A-89B2C7B97CEA}"/>
+                  <a16:creationId xmlns:a16="http://schemas.microsoft.com/office/drawing/2014/main" id="{40EBDF8B-6F52-E776-D556-35692660017F}"/>
                 </a:ext>
               </a:extLst>
             </p:cNvPr>
@@ -12849,15 +12849,16 @@
             </p:cNvPicPr>
             <p:nvPr/>
           </p:nvPicPr>
-          <p:blipFill rotWithShape="1">
+          <p:blipFill>
             <a:blip r:embed="rId3"/>
-            <a:srcRect t="67889" b="23222"/>
-            <a:stretch/>
+            <a:stretch>
+              <a:fillRect/>
+            </a:stretch>
           </p:blipFill>
           <p:spPr>
             <a:xfrm>
-              <a:off x="1265520" y="3756660"/>
-              <a:ext cx="6445319" cy="609600"/>
+              <a:off x="1262062" y="3762342"/>
+              <a:ext cx="6443663" cy="600108"/>
             </a:xfrm>
             <a:prstGeom prst="rect">
               <a:avLst/>
@@ -12908,10 +12909,10 @@
       </p:grpSp>
       <p:grpSp>
         <p:nvGrpSpPr>
-          <p:cNvPr id="15" name="Group 14">
+          <p:cNvPr id="21" name="Group 20">
             <a:extLst>
               <a:ext uri="{FF2B5EF4-FFF2-40B4-BE49-F238E27FC236}">
-                <a16:creationId xmlns:a16="http://schemas.microsoft.com/office/drawing/2014/main" id="{67EE46F5-3D9B-94A6-6B3B-6E6CEE3F1401}"/>
+                <a16:creationId xmlns:a16="http://schemas.microsoft.com/office/drawing/2014/main" id="{68B7BBF7-067F-63C9-3D43-B3E52023692A}"/>
               </a:ext>
             </a:extLst>
           </p:cNvPr>
@@ -12920,18 +12921,18 @@
         </p:nvGrpSpPr>
         <p:grpSpPr>
           <a:xfrm>
-            <a:off x="1265520" y="4457700"/>
-            <a:ext cx="6445319" cy="594360"/>
-            <a:chOff x="1265520" y="4457700"/>
-            <a:chExt cx="6445319" cy="594360"/>
+            <a:off x="1262063" y="4505945"/>
+            <a:ext cx="6453188" cy="600995"/>
+            <a:chOff x="1262063" y="4505945"/>
+            <a:chExt cx="6453188" cy="600995"/>
           </a:xfrm>
         </p:grpSpPr>
         <p:pic>
           <p:nvPicPr>
-            <p:cNvPr id="11" name="Picture 10">
+            <p:cNvPr id="17" name="Picture 16">
               <a:extLst>
                 <a:ext uri="{FF2B5EF4-FFF2-40B4-BE49-F238E27FC236}">
-                  <a16:creationId xmlns:a16="http://schemas.microsoft.com/office/drawing/2014/main" id="{4143454B-3263-CADF-DB18-B002BA3EAE41}"/>
+                  <a16:creationId xmlns:a16="http://schemas.microsoft.com/office/drawing/2014/main" id="{CB46CC52-531B-3F80-2B5C-5C19EF2CFA55}"/>
                 </a:ext>
               </a:extLst>
             </p:cNvPr>
@@ -12940,15 +12941,16 @@
             </p:cNvPicPr>
             <p:nvPr/>
           </p:nvPicPr>
-          <p:blipFill rotWithShape="1">
+          <p:blipFill>
             <a:blip r:embed="rId4"/>
-            <a:srcRect t="68000" b="23333"/>
-            <a:stretch/>
+            <a:stretch>
+              <a:fillRect/>
+            </a:stretch>
           </p:blipFill>
           <p:spPr>
             <a:xfrm>
-              <a:off x="1265520" y="4457700"/>
-              <a:ext cx="6445319" cy="594360"/>
+              <a:off x="1262063" y="4505945"/>
+              <a:ext cx="6453188" cy="600995"/>
             </a:xfrm>
             <a:prstGeom prst="rect">
               <a:avLst/>
@@ -12969,7 +12971,7 @@
           </p:nvSpPr>
           <p:spPr>
             <a:xfrm>
-              <a:off x="7185516" y="4552448"/>
+              <a:off x="7185516" y="4590548"/>
               <a:ext cx="449724" cy="369332"/>
             </a:xfrm>
             <a:prstGeom prst="rect">

</xml_diff>